<commit_message>
small update and typo fix
</commit_message>
<xml_diff>
--- a/Lessons/F_KNN_Decision_Tree/F_Decision Trees.pptx
+++ b/Lessons/F_KNN_Decision_Tree/F_Decision Trees.pptx
@@ -244,7 +244,7 @@
           <a:p>
             <a:fld id="{B0C0A60C-850A-4EA4-9C14-A8FE98B94505}" type="datetimeFigureOut">
               <a:rPr lang="en-US" smtClean="0"/>
-              <a:t>10/18/21</a:t>
+              <a:t>3/7/22</a:t>
             </a:fld>
             <a:endParaRPr lang="en-US"/>
           </a:p>
@@ -1138,7 +1138,7 @@
           <a:p>
             <a:fld id="{5738B90E-0779-4C36-915C-6F05FCD89456}" type="datetime1">
               <a:rPr lang="en-US" smtClean="0"/>
-              <a:t>10/18/21</a:t>
+              <a:t>3/7/22</a:t>
             </a:fld>
             <a:endParaRPr lang="en-US"/>
           </a:p>
@@ -1356,7 +1356,7 @@
           <a:p>
             <a:fld id="{7B9EA29D-D431-42FE-B7B6-AAE4454C77D3}" type="datetime1">
               <a:rPr lang="en-US" smtClean="0"/>
-              <a:t>10/18/21</a:t>
+              <a:t>3/7/22</a:t>
             </a:fld>
             <a:endParaRPr lang="en-US"/>
           </a:p>
@@ -1616,7 +1616,7 @@
           <a:p>
             <a:fld id="{690D8A1E-EA8F-46C1-B891-AE0C00D9C314}" type="datetime1">
               <a:rPr lang="en-US" smtClean="0"/>
-              <a:t>10/18/21</a:t>
+              <a:t>3/7/22</a:t>
             </a:fld>
             <a:endParaRPr lang="en-US"/>
           </a:p>
@@ -1910,7 +1910,7 @@
           <a:p>
             <a:fld id="{D753EFC8-4232-4598-94F6-94C0EBAFC469}" type="datetime1">
               <a:rPr lang="en-US" smtClean="0"/>
-              <a:t>10/18/21</a:t>
+              <a:t>3/7/22</a:t>
             </a:fld>
             <a:endParaRPr lang="en-US"/>
           </a:p>
@@ -2225,7 +2225,7 @@
           <a:p>
             <a:fld id="{F3161074-1C18-4AE7-957D-F18524378C85}" type="datetime1">
               <a:rPr lang="en-US" smtClean="0"/>
-              <a:t>10/18/21</a:t>
+              <a:t>3/7/22</a:t>
             </a:fld>
             <a:endParaRPr lang="en-US"/>
           </a:p>
@@ -2499,7 +2499,7 @@
           <a:p>
             <a:fld id="{69BE256C-8D9A-4404-B47D-41A1AE514425}" type="datetime1">
               <a:rPr lang="en-US" smtClean="0"/>
-              <a:t>10/18/21</a:t>
+              <a:t>3/7/22</a:t>
             </a:fld>
             <a:endParaRPr lang="en-US"/>
           </a:p>
@@ -2933,7 +2933,7 @@
           <a:p>
             <a:fld id="{66CB2154-9035-4012-8189-BAAB61C5A5EE}" type="datetime1">
               <a:rPr lang="en-US" smtClean="0"/>
-              <a:t>10/18/21</a:t>
+              <a:t>3/7/22</a:t>
             </a:fld>
             <a:endParaRPr lang="en-US"/>
           </a:p>
@@ -3107,7 +3107,7 @@
           <a:p>
             <a:fld id="{6700A58B-DD98-43D0-B791-721480A02982}" type="datetime1">
               <a:rPr lang="en-US" smtClean="0"/>
-              <a:t>10/18/21</a:t>
+              <a:t>3/7/22</a:t>
             </a:fld>
             <a:endParaRPr lang="en-US"/>
           </a:p>
@@ -3299,7 +3299,7 @@
           <a:p>
             <a:fld id="{7DB6E382-4F61-4E24-BE1A-377EC83D0E3A}" type="datetime1">
               <a:rPr lang="en-US" smtClean="0"/>
-              <a:t>10/18/21</a:t>
+              <a:t>3/7/22</a:t>
             </a:fld>
             <a:endParaRPr lang="en-US"/>
           </a:p>
@@ -3610,7 +3610,7 @@
           <a:p>
             <a:fld id="{4142EED6-FC16-45B9-B8C4-2BC5DBA88325}" type="datetime1">
               <a:rPr lang="en-US" smtClean="0"/>
-              <a:t>10/18/21</a:t>
+              <a:t>3/7/22</a:t>
             </a:fld>
             <a:endParaRPr lang="en-US"/>
           </a:p>
@@ -3928,7 +3928,7 @@
           <a:p>
             <a:fld id="{DF59512B-4F1D-43D7-8819-2F53FEF69650}" type="datetime1">
               <a:rPr lang="en-US" smtClean="0"/>
-              <a:t>10/18/21</a:t>
+              <a:t>3/7/22</a:t>
             </a:fld>
             <a:endParaRPr lang="en-US"/>
           </a:p>
@@ -4204,7 +4204,7 @@
           <a:p>
             <a:fld id="{08437B94-E2BF-44DC-ADC5-B05FC9934E9D}" type="datetime1">
               <a:rPr lang="en-US" smtClean="0"/>
-              <a:t>10/18/21</a:t>
+              <a:t>3/7/22</a:t>
             </a:fld>
             <a:endParaRPr lang="en-US"/>
           </a:p>
@@ -4724,7 +4724,7 @@
           <a:p>
             <a:fld id="{5738B90E-0779-4C36-915C-6F05FCD89456}" type="datetime1">
               <a:rPr lang="en-US" smtClean="0"/>
-              <a:t>10/18/21</a:t>
+              <a:t>3/7/22</a:t>
             </a:fld>
             <a:endParaRPr lang="en-US"/>
           </a:p>
@@ -4840,7 +4840,7 @@
           <a:p>
             <a:fld id="{6700A58B-DD98-43D0-B791-721480A02982}" type="datetime1">
               <a:rPr lang="en-US" smtClean="0"/>
-              <a:t>10/18/21</a:t>
+              <a:t>3/7/22</a:t>
             </a:fld>
             <a:endParaRPr lang="en-US"/>
           </a:p>
@@ -5170,7 +5170,7 @@
           <a:p>
             <a:fld id="{6700A58B-DD98-43D0-B791-721480A02982}" type="datetime1">
               <a:rPr lang="en-US" smtClean="0"/>
-              <a:t>10/18/21</a:t>
+              <a:t>3/7/22</a:t>
             </a:fld>
             <a:endParaRPr lang="en-US"/>
           </a:p>
@@ -5524,7 +5524,7 @@
           <a:p>
             <a:fld id="{6700A58B-DD98-43D0-B791-721480A02982}" type="datetime1">
               <a:rPr lang="en-US" smtClean="0"/>
-              <a:t>10/18/21</a:t>
+              <a:t>3/7/22</a:t>
             </a:fld>
             <a:endParaRPr lang="en-US"/>
           </a:p>
@@ -5819,7 +5819,7 @@
           <a:p>
             <a:fld id="{6700A58B-DD98-43D0-B791-721480A02982}" type="datetime1">
               <a:rPr lang="en-US" smtClean="0"/>
-              <a:t>10/18/21</a:t>
+              <a:t>3/7/22</a:t>
             </a:fld>
             <a:endParaRPr lang="en-US"/>
           </a:p>
@@ -6114,7 +6114,7 @@
           <a:p>
             <a:fld id="{6700A58B-DD98-43D0-B791-721480A02982}" type="datetime1">
               <a:rPr lang="en-US" smtClean="0"/>
-              <a:t>10/18/21</a:t>
+              <a:t>3/7/22</a:t>
             </a:fld>
             <a:endParaRPr lang="en-US"/>
           </a:p>
@@ -6547,7 +6547,7 @@
           <a:p>
             <a:fld id="{7DB6E382-4F61-4E24-BE1A-377EC83D0E3A}" type="datetime1">
               <a:rPr lang="en-US" smtClean="0"/>
-              <a:t>10/18/21</a:t>
+              <a:t>3/7/22</a:t>
             </a:fld>
             <a:endParaRPr lang="en-US"/>
           </a:p>
@@ -6891,7 +6891,7 @@
           <a:p>
             <a:fld id="{6700A58B-DD98-43D0-B791-721480A02982}" type="datetime1">
               <a:rPr lang="en-US" smtClean="0"/>
-              <a:t>10/18/21</a:t>
+              <a:t>3/7/22</a:t>
             </a:fld>
             <a:endParaRPr lang="en-US"/>
           </a:p>
@@ -7685,7 +7685,7 @@
           <a:p>
             <a:fld id="{6700A58B-DD98-43D0-B791-721480A02982}" type="datetime1">
               <a:rPr lang="en-US" smtClean="0"/>
-              <a:t>10/18/21</a:t>
+              <a:t>3/7/22</a:t>
             </a:fld>
             <a:endParaRPr lang="en-US"/>
           </a:p>
@@ -8726,7 +8726,7 @@
           <a:p>
             <a:fld id="{6700A58B-DD98-43D0-B791-721480A02982}" type="datetime1">
               <a:rPr lang="en-US" smtClean="0"/>
-              <a:t>10/18/21</a:t>
+              <a:t>3/7/22</a:t>
             </a:fld>
             <a:endParaRPr lang="en-US"/>
           </a:p>
@@ -10160,7 +10160,7 @@
           <a:p>
             <a:fld id="{6700A58B-DD98-43D0-B791-721480A02982}" type="datetime1">
               <a:rPr lang="en-US" smtClean="0"/>
-              <a:t>10/18/21</a:t>
+              <a:t>3/7/22</a:t>
             </a:fld>
             <a:endParaRPr lang="en-US"/>
           </a:p>
@@ -10444,7 +10444,7 @@
           <a:p>
             <a:fld id="{6700A58B-DD98-43D0-B791-721480A02982}" type="datetime1">
               <a:rPr lang="en-US" smtClean="0"/>
-              <a:t>10/18/21</a:t>
+              <a:t>3/7/22</a:t>
             </a:fld>
             <a:endParaRPr lang="en-US"/>
           </a:p>
@@ -11555,7 +11555,7 @@
           <a:p>
             <a:fld id="{6700A58B-DD98-43D0-B791-721480A02982}" type="datetime1">
               <a:rPr lang="en-US" smtClean="0"/>
-              <a:t>10/18/21</a:t>
+              <a:t>3/7/22</a:t>
             </a:fld>
             <a:endParaRPr lang="en-US"/>
           </a:p>
@@ -12490,7 +12490,7 @@
           <a:p>
             <a:fld id="{6700A58B-DD98-43D0-B791-721480A02982}" type="datetime1">
               <a:rPr lang="en-US" smtClean="0"/>
-              <a:t>10/18/21</a:t>
+              <a:t>3/7/22</a:t>
             </a:fld>
             <a:endParaRPr lang="en-US"/>
           </a:p>
@@ -12814,7 +12814,7 @@
           <a:p>
             <a:fld id="{6700A58B-DD98-43D0-B791-721480A02982}" type="datetime1">
               <a:rPr lang="en-US" smtClean="0"/>
-              <a:t>10/18/21</a:t>
+              <a:t>3/7/22</a:t>
             </a:fld>
             <a:endParaRPr lang="en-US"/>
           </a:p>
@@ -14099,7 +14099,7 @@
                 <a:tabLst/>
                 <a:defRPr/>
               </a:pPr>
-              <a:t>10/18/21</a:t>
+              <a:t>3/7/22</a:t>
             </a:fld>
             <a:endParaRPr kumimoji="0" lang="en-US" sz="900" b="0" i="0" u="none" strike="noStrike" kern="1200" cap="none" spc="0" normalizeH="0" baseline="0" noProof="0">
               <a:ln>
@@ -15589,7 +15589,7 @@
                 <a:tabLst/>
                 <a:defRPr/>
               </a:pPr>
-              <a:t>10/18/21</a:t>
+              <a:t>3/7/22</a:t>
             </a:fld>
             <a:endParaRPr kumimoji="0" lang="en-US" sz="900" b="0" i="0" u="none" strike="noStrike" kern="1200" cap="none" spc="0" normalizeH="0" baseline="0" noProof="0">
               <a:ln>
@@ -17141,7 +17141,7 @@
                 <a:tabLst/>
                 <a:defRPr/>
               </a:pPr>
-              <a:t>10/18/21</a:t>
+              <a:t>3/7/22</a:t>
             </a:fld>
             <a:endParaRPr kumimoji="0" lang="en-US" sz="900" b="0" i="0" u="none" strike="noStrike" kern="1200" cap="none" spc="0" normalizeH="0" baseline="0" noProof="0">
               <a:ln>
@@ -17794,7 +17794,7 @@
                 <a:tabLst/>
                 <a:defRPr/>
               </a:pPr>
-              <a:t>10/18/21</a:t>
+              <a:t>3/7/22</a:t>
             </a:fld>
             <a:endParaRPr kumimoji="0" lang="en-US" sz="900" b="0" i="0" u="none" strike="noStrike" kern="1200" cap="none" spc="0" normalizeH="0" baseline="0" noProof="0">
               <a:ln>
@@ -18429,7 +18429,7 @@
             <a:pPr eaLnBrk="1" hangingPunct="1"/>
             <a:r>
               <a:rPr lang="en-US" altLang="en-US" dirty="0"/>
-              <a:t>Try all other split values within the duration vector</a:t>
+              <a:t>Try all other split values within the duration vector (column)</a:t>
             </a:r>
           </a:p>
           <a:p>
@@ -18492,7 +18492,7 @@
           <a:p>
             <a:fld id="{9B19E99B-5349-415A-8E56-8E989211A366}" type="datetime1">
               <a:rPr lang="en-US" smtClean="0"/>
-              <a:t>10/18/21</a:t>
+              <a:t>3/7/22</a:t>
             </a:fld>
             <a:endParaRPr lang="en-US"/>
           </a:p>
@@ -18642,7 +18642,7 @@
           <a:p>
             <a:fld id="{6700A58B-DD98-43D0-B791-721480A02982}" type="datetime1">
               <a:rPr lang="en-US" smtClean="0"/>
-              <a:t>10/18/21</a:t>
+              <a:t>3/7/22</a:t>
             </a:fld>
             <a:endParaRPr lang="en-US"/>
           </a:p>
@@ -18889,7 +18889,7 @@
           <a:p>
             <a:fld id="{6700A58B-DD98-43D0-B791-721480A02982}" type="datetime1">
               <a:rPr lang="en-US" smtClean="0"/>
-              <a:t>10/18/21</a:t>
+              <a:t>3/7/22</a:t>
             </a:fld>
             <a:endParaRPr lang="en-US"/>
           </a:p>
@@ -19575,7 +19575,7 @@
           <a:p>
             <a:fld id="{9B19E99B-5349-415A-8E56-8E989211A366}" type="datetime1">
               <a:rPr lang="en-US" smtClean="0"/>
-              <a:t>10/18/21</a:t>
+              <a:t>3/7/22</a:t>
             </a:fld>
             <a:endParaRPr lang="en-US"/>
           </a:p>
@@ -19709,7 +19709,7 @@
           <a:p>
             <a:fld id="{6700A58B-DD98-43D0-B791-721480A02982}" type="datetime1">
               <a:rPr lang="en-US" smtClean="0"/>
-              <a:t>10/18/21</a:t>
+              <a:t>3/7/22</a:t>
             </a:fld>
             <a:endParaRPr lang="en-US"/>
           </a:p>
@@ -20171,7 +20171,7 @@
           <a:p>
             <a:fld id="{6700A58B-DD98-43D0-B791-721480A02982}" type="datetime1">
               <a:rPr lang="en-US" smtClean="0"/>
-              <a:t>10/18/21</a:t>
+              <a:t>3/7/22</a:t>
             </a:fld>
             <a:endParaRPr lang="en-US"/>
           </a:p>
@@ -21618,7 +21618,7 @@
           <a:p>
             <a:fld id="{6700A58B-DD98-43D0-B791-721480A02982}" type="datetime1">
               <a:rPr lang="en-US" smtClean="0"/>
-              <a:t>10/18/21</a:t>
+              <a:t>3/7/22</a:t>
             </a:fld>
             <a:endParaRPr lang="en-US"/>
           </a:p>
@@ -21871,7 +21871,7 @@
           <a:p>
             <a:fld id="{6700A58B-DD98-43D0-B791-721480A02982}" type="datetime1">
               <a:rPr lang="en-US" smtClean="0"/>
-              <a:t>10/18/21</a:t>
+              <a:t>3/7/22</a:t>
             </a:fld>
             <a:endParaRPr lang="en-US"/>
           </a:p>
@@ -22017,7 +22017,7 @@
           <a:p>
             <a:fld id="{6700A58B-DD98-43D0-B791-721480A02982}" type="datetime1">
               <a:rPr lang="en-US" smtClean="0"/>
-              <a:t>10/18/21</a:t>
+              <a:t>3/7/22</a:t>
             </a:fld>
             <a:endParaRPr lang="en-US"/>
           </a:p>
@@ -22722,7 +22722,7 @@
           <a:p>
             <a:fld id="{6700A58B-DD98-43D0-B791-721480A02982}" type="datetime1">
               <a:rPr lang="en-US" smtClean="0"/>
-              <a:t>10/18/21</a:t>
+              <a:t>3/7/22</a:t>
             </a:fld>
             <a:endParaRPr lang="en-US"/>
           </a:p>
@@ -23043,7 +23043,7 @@
           <a:p>
             <a:fld id="{9B19E99B-5349-415A-8E56-8E989211A366}" type="datetime1">
               <a:rPr lang="en-US" smtClean="0"/>
-              <a:t>10/18/21</a:t>
+              <a:t>3/7/22</a:t>
             </a:fld>
             <a:endParaRPr lang="en-US"/>
           </a:p>
@@ -23163,7 +23163,7 @@
           <a:p>
             <a:fld id="{6700A58B-DD98-43D0-B791-721480A02982}" type="datetime1">
               <a:rPr lang="en-US" smtClean="0"/>
-              <a:t>10/18/21</a:t>
+              <a:t>3/7/22</a:t>
             </a:fld>
             <a:endParaRPr lang="en-US"/>
           </a:p>
@@ -23396,7 +23396,7 @@
           <a:p>
             <a:fld id="{6700A58B-DD98-43D0-B791-721480A02982}" type="datetime1">
               <a:rPr lang="en-US" smtClean="0"/>
-              <a:t>10/18/21</a:t>
+              <a:t>3/7/22</a:t>
             </a:fld>
             <a:endParaRPr lang="en-US"/>
           </a:p>
@@ -23609,7 +23609,7 @@
           <a:p>
             <a:fld id="{6700A58B-DD98-43D0-B791-721480A02982}" type="datetime1">
               <a:rPr lang="en-US" smtClean="0"/>
-              <a:t>10/18/21</a:t>
+              <a:t>3/7/22</a:t>
             </a:fld>
             <a:endParaRPr lang="en-US"/>
           </a:p>
@@ -24054,7 +24054,7 @@
           <a:p>
             <a:fld id="{9B19E99B-5349-415A-8E56-8E989211A366}" type="datetime1">
               <a:rPr lang="en-US" smtClean="0"/>
-              <a:t>10/18/21</a:t>
+              <a:t>3/7/22</a:t>
             </a:fld>
             <a:endParaRPr lang="en-US"/>
           </a:p>

</xml_diff>